<commit_message>
march 6 updates (post-committeee meeting)
</commit_message>
<xml_diff>
--- a/Reports/Preliminary Findings PPT.pptx
+++ b/Reports/Preliminary Findings PPT.pptx
@@ -115,6 +115,11 @@
       </a:defRPr>
     </a:lvl9pPr>
   </p:defaultTextStyle>
+  <p:extLst>
+    <p:ext uri="{EFAFB233-063F-42B5-8137-9DF3F51BA10A}">
+      <p15:sldGuideLst xmlns:p15="http://schemas.microsoft.com/office/powerpoint/2012/main"/>
+    </p:ext>
+  </p:extLst>
 </p:presentation>
 </file>
 
@@ -130,8 +135,8 @@
 <pc:chgInfo xmlns:a="http://schemas.openxmlformats.org/drawingml/2006/main" xmlns:r="http://schemas.openxmlformats.org/officeDocument/2006/relationships" xmlns:ac="http://schemas.microsoft.com/office/drawing/2013/main/command" xmlns:pc="http://schemas.microsoft.com/office/powerpoint/2013/main/command">
   <pc:docChgLst>
     <pc:chgData name="Edward Bosko" userId="3c2d16a148962151" providerId="LiveId" clId="{A3B7949D-3481-482C-8D79-C7CE87E70E15}"/>
-    <pc:docChg chg="undo custSel addSld delSld modSld">
-      <pc:chgData name="Edward Bosko" userId="3c2d16a148962151" providerId="LiveId" clId="{A3B7949D-3481-482C-8D79-C7CE87E70E15}" dt="2025-03-04T08:14:16.511" v="4527" actId="20577"/>
+    <pc:docChg chg="undo redo custSel addSld delSld modSld">
+      <pc:chgData name="Edward Bosko" userId="3c2d16a148962151" providerId="LiveId" clId="{A3B7949D-3481-482C-8D79-C7CE87E70E15}" dt="2025-03-06T17:51:52.350" v="4836" actId="20577"/>
       <pc:docMkLst>
         <pc:docMk/>
       </pc:docMkLst>
@@ -180,14 +185,6 @@
             <ac:spMk id="3" creationId="{BBDF2D6D-1CD5-3EDF-7447-54E552179308}"/>
           </ac:spMkLst>
         </pc:spChg>
-        <pc:spChg chg="del">
-          <ac:chgData name="Edward Bosko" userId="3c2d16a148962151" providerId="LiveId" clId="{A3B7949D-3481-482C-8D79-C7CE87E70E15}" dt="2025-03-03T20:37:04.127" v="151" actId="22"/>
-          <ac:spMkLst>
-            <pc:docMk/>
-            <pc:sldMk cId="3115102715" sldId="257"/>
-            <ac:spMk id="4" creationId="{2E00C8BA-EC71-6F11-BFD7-F1E4FD3AF659}"/>
-          </ac:spMkLst>
-        </pc:spChg>
         <pc:spChg chg="add mod">
           <ac:chgData name="Edward Bosko" userId="3c2d16a148962151" providerId="LiveId" clId="{A3B7949D-3481-482C-8D79-C7CE87E70E15}" dt="2025-03-03T21:43:57.180" v="993" actId="1076"/>
           <ac:spMkLst>
@@ -218,22 +215,6 @@
           <pc:docMk/>
           <pc:sldMk cId="2923476133" sldId="259"/>
         </pc:sldMkLst>
-        <pc:spChg chg="mod">
-          <ac:chgData name="Edward Bosko" userId="3c2d16a148962151" providerId="LiveId" clId="{A3B7949D-3481-482C-8D79-C7CE87E70E15}" dt="2025-03-03T21:31:39.362" v="522" actId="20577"/>
-          <ac:spMkLst>
-            <pc:docMk/>
-            <pc:sldMk cId="2923476133" sldId="259"/>
-            <ac:spMk id="2" creationId="{27D84150-B1C9-3766-557C-AFA00DC793C5}"/>
-          </ac:spMkLst>
-        </pc:spChg>
-        <pc:spChg chg="mod">
-          <ac:chgData name="Edward Bosko" userId="3c2d16a148962151" providerId="LiveId" clId="{A3B7949D-3481-482C-8D79-C7CE87E70E15}" dt="2025-03-03T21:31:04.480" v="503" actId="20577"/>
-          <ac:spMkLst>
-            <pc:docMk/>
-            <pc:sldMk cId="2923476133" sldId="259"/>
-            <ac:spMk id="3" creationId="{2AF6BCBC-8622-BFBB-8F17-49D3933AEC20}"/>
-          </ac:spMkLst>
-        </pc:spChg>
       </pc:sldChg>
       <pc:sldChg chg="addSp delSp modSp new mod">
         <pc:chgData name="Edward Bosko" userId="3c2d16a148962151" providerId="LiveId" clId="{A3B7949D-3481-482C-8D79-C7CE87E70E15}" dt="2025-03-03T23:52:35.069" v="3185" actId="478"/>
@@ -265,23 +246,15 @@
             <ac:spMk id="4" creationId="{2B9EC06F-2365-EEF4-F1F3-C8AB0B65EA76}"/>
           </ac:spMkLst>
         </pc:spChg>
-        <pc:spChg chg="add del mod">
-          <ac:chgData name="Edward Bosko" userId="3c2d16a148962151" providerId="LiveId" clId="{A3B7949D-3481-482C-8D79-C7CE87E70E15}" dt="2025-03-03T23:52:35.069" v="3185" actId="478"/>
-          <ac:spMkLst>
-            <pc:docMk/>
-            <pc:sldMk cId="2459461784" sldId="260"/>
-            <ac:spMk id="5" creationId="{4F12935D-D1E7-D3AB-5EC5-7C86049E345E}"/>
-          </ac:spMkLst>
-        </pc:spChg>
       </pc:sldChg>
       <pc:sldChg chg="modSp new mod">
-        <pc:chgData name="Edward Bosko" userId="3c2d16a148962151" providerId="LiveId" clId="{A3B7949D-3481-482C-8D79-C7CE87E70E15}" dt="2025-03-03T21:45:05.864" v="1019"/>
+        <pc:chgData name="Edward Bosko" userId="3c2d16a148962151" providerId="LiveId" clId="{A3B7949D-3481-482C-8D79-C7CE87E70E15}" dt="2025-03-05T23:35:59.154" v="4816" actId="20577"/>
         <pc:sldMkLst>
           <pc:docMk/>
           <pc:sldMk cId="2656645177" sldId="261"/>
         </pc:sldMkLst>
         <pc:spChg chg="mod">
-          <ac:chgData name="Edward Bosko" userId="3c2d16a148962151" providerId="LiveId" clId="{A3B7949D-3481-482C-8D79-C7CE87E70E15}" dt="2025-03-03T21:44:13.083" v="1011" actId="20577"/>
+          <ac:chgData name="Edward Bosko" userId="3c2d16a148962151" providerId="LiveId" clId="{A3B7949D-3481-482C-8D79-C7CE87E70E15}" dt="2025-03-05T23:35:59.154" v="4816" actId="20577"/>
           <ac:spMkLst>
             <pc:docMk/>
             <pc:sldMk cId="2656645177" sldId="261"/>
@@ -319,14 +292,6 @@
             <ac:spMk id="3" creationId="{8D61B712-5DFC-D618-CE58-AFCF4F464DF1}"/>
           </ac:spMkLst>
         </pc:spChg>
-        <pc:picChg chg="add del mod">
-          <ac:chgData name="Edward Bosko" userId="3c2d16a148962151" providerId="LiveId" clId="{A3B7949D-3481-482C-8D79-C7CE87E70E15}" dt="2025-03-03T23:01:49.601" v="2025" actId="21"/>
-          <ac:picMkLst>
-            <pc:docMk/>
-            <pc:sldMk cId="46355913" sldId="262"/>
-            <ac:picMk id="5" creationId="{7AD8EE81-36FF-83D7-61D7-B77A36682C34}"/>
-          </ac:picMkLst>
-        </pc:picChg>
         <pc:picChg chg="add mod">
           <ac:chgData name="Edward Bosko" userId="3c2d16a148962151" providerId="LiveId" clId="{A3B7949D-3481-482C-8D79-C7CE87E70E15}" dt="2025-03-03T23:01:59.587" v="2027" actId="1076"/>
           <ac:picMkLst>
@@ -358,14 +323,6 @@
             <ac:spMk id="3" creationId="{6B2E167F-0E59-FB85-80B9-11DEE7314750}"/>
           </ac:spMkLst>
         </pc:spChg>
-        <pc:spChg chg="add">
-          <ac:chgData name="Edward Bosko" userId="3c2d16a148962151" providerId="LiveId" clId="{A3B7949D-3481-482C-8D79-C7CE87E70E15}" dt="2025-03-03T21:48:43.315" v="1114"/>
-          <ac:spMkLst>
-            <pc:docMk/>
-            <pc:sldMk cId="3626724265" sldId="263"/>
-            <ac:spMk id="4" creationId="{F9AF5B02-F369-F1AE-FC76-76AF2EE2EE8F}"/>
-          </ac:spMkLst>
-        </pc:spChg>
       </pc:sldChg>
       <pc:sldChg chg="modSp new del mod">
         <pc:chgData name="Edward Bosko" userId="3c2d16a148962151" providerId="LiveId" clId="{A3B7949D-3481-482C-8D79-C7CE87E70E15}" dt="2025-03-03T23:18:05.549" v="2102" actId="47"/>
@@ -373,25 +330,9 @@
           <pc:docMk/>
           <pc:sldMk cId="1234227698" sldId="264"/>
         </pc:sldMkLst>
-        <pc:spChg chg="mod">
-          <ac:chgData name="Edward Bosko" userId="3c2d16a148962151" providerId="LiveId" clId="{A3B7949D-3481-482C-8D79-C7CE87E70E15}" dt="2025-03-03T23:17:44.696" v="2100" actId="20577"/>
-          <ac:spMkLst>
-            <pc:docMk/>
-            <pc:sldMk cId="1234227698" sldId="264"/>
-            <ac:spMk id="2" creationId="{32683A92-238C-C5BD-27D0-2FDE3F9EEFB4}"/>
-          </ac:spMkLst>
-        </pc:spChg>
-        <pc:spChg chg="mod">
-          <ac:chgData name="Edward Bosko" userId="3c2d16a148962151" providerId="LiveId" clId="{A3B7949D-3481-482C-8D79-C7CE87E70E15}" dt="2025-03-03T23:17:37.518" v="2070" actId="20577"/>
-          <ac:spMkLst>
-            <pc:docMk/>
-            <pc:sldMk cId="1234227698" sldId="264"/>
-            <ac:spMk id="3" creationId="{83E63F9A-FC2E-1E2C-36A4-9F3C66BC3466}"/>
-          </ac:spMkLst>
-        </pc:spChg>
       </pc:sldChg>
       <pc:sldChg chg="addSp modSp new mod">
-        <pc:chgData name="Edward Bosko" userId="3c2d16a148962151" providerId="LiveId" clId="{A3B7949D-3481-482C-8D79-C7CE87E70E15}" dt="2025-03-04T00:32:15.159" v="3611" actId="20577"/>
+        <pc:chgData name="Edward Bosko" userId="3c2d16a148962151" providerId="LiveId" clId="{A3B7949D-3481-482C-8D79-C7CE87E70E15}" dt="2025-03-06T17:51:52.350" v="4836" actId="20577"/>
         <pc:sldMkLst>
           <pc:docMk/>
           <pc:sldMk cId="3976534565" sldId="265"/>
@@ -413,7 +354,7 @@
           </ac:spMkLst>
         </pc:spChg>
         <pc:spChg chg="mod">
-          <ac:chgData name="Edward Bosko" userId="3c2d16a148962151" providerId="LiveId" clId="{A3B7949D-3481-482C-8D79-C7CE87E70E15}" dt="2025-03-04T00:31:14.348" v="3454" actId="27636"/>
+          <ac:chgData name="Edward Bosko" userId="3c2d16a148962151" providerId="LiveId" clId="{A3B7949D-3481-482C-8D79-C7CE87E70E15}" dt="2025-03-05T23:35:51.878" v="4809" actId="20577"/>
           <ac:spMkLst>
             <pc:docMk/>
             <pc:sldMk cId="3976534565" sldId="265"/>
@@ -429,7 +370,7 @@
           </ac:spMkLst>
         </pc:spChg>
         <pc:spChg chg="mod">
-          <ac:chgData name="Edward Bosko" userId="3c2d16a148962151" providerId="LiveId" clId="{A3B7949D-3481-482C-8D79-C7CE87E70E15}" dt="2025-03-04T00:32:15.159" v="3611" actId="20577"/>
+          <ac:chgData name="Edward Bosko" userId="3c2d16a148962151" providerId="LiveId" clId="{A3B7949D-3481-482C-8D79-C7CE87E70E15}" dt="2025-03-06T17:51:52.350" v="4836" actId="20577"/>
           <ac:spMkLst>
             <pc:docMk/>
             <pc:sldMk cId="3976534565" sldId="265"/>
@@ -451,25 +392,9 @@
           <pc:docMk/>
           <pc:sldMk cId="3937001847" sldId="266"/>
         </pc:sldMkLst>
-        <pc:spChg chg="mod">
-          <ac:chgData name="Edward Bosko" userId="3c2d16a148962151" providerId="LiveId" clId="{A3B7949D-3481-482C-8D79-C7CE87E70E15}" dt="2025-03-04T00:44:32.511" v="3635" actId="20577"/>
-          <ac:spMkLst>
-            <pc:docMk/>
-            <pc:sldMk cId="3937001847" sldId="266"/>
-            <ac:spMk id="2" creationId="{FB03EEA7-304E-DFD0-302D-4CCA68384F55}"/>
-          </ac:spMkLst>
-        </pc:spChg>
-        <pc:spChg chg="mod">
-          <ac:chgData name="Edward Bosko" userId="3c2d16a148962151" providerId="LiveId" clId="{A3B7949D-3481-482C-8D79-C7CE87E70E15}" dt="2025-03-04T00:44:39.320" v="3636" actId="14100"/>
-          <ac:spMkLst>
-            <pc:docMk/>
-            <pc:sldMk cId="3937001847" sldId="266"/>
-            <ac:spMk id="3" creationId="{C098C643-C3BD-BCF6-8B92-9F8AA8074058}"/>
-          </ac:spMkLst>
-        </pc:spChg>
       </pc:sldChg>
       <pc:sldChg chg="addSp delSp modSp new mod">
-        <pc:chgData name="Edward Bosko" userId="3c2d16a148962151" providerId="LiveId" clId="{A3B7949D-3481-482C-8D79-C7CE87E70E15}" dt="2025-03-04T07:46:13.701" v="3802" actId="14100"/>
+        <pc:chgData name="Edward Bosko" userId="3c2d16a148962151" providerId="LiveId" clId="{A3B7949D-3481-482C-8D79-C7CE87E70E15}" dt="2025-03-05T23:25:41.698" v="4670" actId="14100"/>
         <pc:sldMkLst>
           <pc:docMk/>
           <pc:sldMk cId="2630178930" sldId="267"/>
@@ -482,72 +407,48 @@
             <ac:spMk id="2" creationId="{045F794B-9552-48F7-CC3F-91158C31F53A}"/>
           </ac:spMkLst>
         </pc:spChg>
-        <pc:spChg chg="del">
-          <ac:chgData name="Edward Bosko" userId="3c2d16a148962151" providerId="LiveId" clId="{A3B7949D-3481-482C-8D79-C7CE87E70E15}" dt="2025-03-04T01:15:05.767" v="3662" actId="22"/>
+        <pc:spChg chg="add del mod">
+          <ac:chgData name="Edward Bosko" userId="3c2d16a148962151" providerId="LiveId" clId="{A3B7949D-3481-482C-8D79-C7CE87E70E15}" dt="2025-03-05T23:24:45.236" v="4661" actId="22"/>
           <ac:spMkLst>
             <pc:docMk/>
             <pc:sldMk cId="2630178930" sldId="267"/>
-            <ac:spMk id="3" creationId="{1CEBAC8E-3979-DD11-807E-FC7A32E1F18C}"/>
+            <ac:spMk id="4" creationId="{2ED9F59E-8682-9630-279F-04A03D4772D1}"/>
           </ac:spMkLst>
         </pc:spChg>
-        <pc:spChg chg="del">
-          <ac:chgData name="Edward Bosko" userId="3c2d16a148962151" providerId="LiveId" clId="{A3B7949D-3481-482C-8D79-C7CE87E70E15}" dt="2025-03-04T01:17:55.792" v="3664" actId="22"/>
+        <pc:spChg chg="add del mod">
+          <ac:chgData name="Edward Bosko" userId="3c2d16a148962151" providerId="LiveId" clId="{A3B7949D-3481-482C-8D79-C7CE87E70E15}" dt="2025-03-05T23:25:32.979" v="4668" actId="22"/>
           <ac:spMkLst>
             <pc:docMk/>
             <pc:sldMk cId="2630178930" sldId="267"/>
-            <ac:spMk id="4" creationId="{A28A3019-E630-8092-B5AD-B977E3ACD263}"/>
+            <ac:spMk id="9" creationId="{27CF0E58-DE1B-A1C2-526A-71AD1692B7FE}"/>
           </ac:spMkLst>
         </pc:spChg>
-        <pc:spChg chg="add del mod">
-          <ac:chgData name="Edward Bosko" userId="3c2d16a148962151" providerId="LiveId" clId="{A3B7949D-3481-482C-8D79-C7CE87E70E15}" dt="2025-03-04T06:51:41.727" v="3796" actId="22"/>
-          <ac:spMkLst>
-            <pc:docMk/>
-            <pc:sldMk cId="2630178930" sldId="267"/>
-            <ac:spMk id="12" creationId="{933C5222-C77B-D139-D981-89429987DD12}"/>
-          </ac:spMkLst>
-        </pc:spChg>
-        <pc:spChg chg="add del mod">
-          <ac:chgData name="Edward Bosko" userId="3c2d16a148962151" providerId="LiveId" clId="{A3B7949D-3481-482C-8D79-C7CE87E70E15}" dt="2025-03-04T07:46:03.178" v="3800" actId="22"/>
-          <ac:spMkLst>
-            <pc:docMk/>
-            <pc:sldMk cId="2630178930" sldId="267"/>
-            <ac:spMk id="16" creationId="{8C131837-861B-2E5C-6571-99DB723C16A2}"/>
-          </ac:spMkLst>
-        </pc:spChg>
-        <pc:picChg chg="add mod ord">
-          <ac:chgData name="Edward Bosko" userId="3c2d16a148962151" providerId="LiveId" clId="{A3B7949D-3481-482C-8D79-C7CE87E70E15}" dt="2025-03-04T01:18:28.854" v="3672" actId="1076"/>
+        <pc:picChg chg="add del mod ord">
+          <ac:chgData name="Edward Bosko" userId="3c2d16a148962151" providerId="LiveId" clId="{A3B7949D-3481-482C-8D79-C7CE87E70E15}" dt="2025-03-05T23:24:43.210" v="4660" actId="478"/>
           <ac:picMkLst>
             <pc:docMk/>
             <pc:sldMk cId="2630178930" sldId="267"/>
             <ac:picMk id="6" creationId="{8117DBC7-E23A-D46D-C15C-74DA21D2EB7D}"/>
           </ac:picMkLst>
         </pc:picChg>
-        <pc:picChg chg="add del mod ord">
-          <ac:chgData name="Edward Bosko" userId="3c2d16a148962151" providerId="LiveId" clId="{A3B7949D-3481-482C-8D79-C7CE87E70E15}" dt="2025-03-04T06:51:32.471" v="3793" actId="478"/>
+        <pc:picChg chg="add mod ord">
+          <ac:chgData name="Edward Bosko" userId="3c2d16a148962151" providerId="LiveId" clId="{A3B7949D-3481-482C-8D79-C7CE87E70E15}" dt="2025-03-05T23:25:01.976" v="4665" actId="1076"/>
           <ac:picMkLst>
             <pc:docMk/>
             <pc:sldMk cId="2630178930" sldId="267"/>
-            <ac:picMk id="8" creationId="{E82FD77D-1052-F576-5ADE-5CC8E885E649}"/>
+            <ac:picMk id="7" creationId="{0D0C95A1-88BE-082D-3A8B-484999B3B7AE}"/>
           </ac:picMkLst>
         </pc:picChg>
-        <pc:picChg chg="add del mod">
-          <ac:chgData name="Edward Bosko" userId="3c2d16a148962151" providerId="LiveId" clId="{A3B7949D-3481-482C-8D79-C7CE87E70E15}" dt="2025-03-04T06:51:39.290" v="3795" actId="478"/>
+        <pc:picChg chg="add mod ord">
+          <ac:chgData name="Edward Bosko" userId="3c2d16a148962151" providerId="LiveId" clId="{A3B7949D-3481-482C-8D79-C7CE87E70E15}" dt="2025-03-05T23:25:41.698" v="4670" actId="14100"/>
           <ac:picMkLst>
             <pc:docMk/>
             <pc:sldMk cId="2630178930" sldId="267"/>
-            <ac:picMk id="10" creationId="{B1C82F60-A4F0-91D8-BA11-D1476BBF9F3C}"/>
+            <ac:picMk id="11" creationId="{EA97D9EC-6128-B7C4-00EA-4BC81BDF61EF}"/>
           </ac:picMkLst>
         </pc:picChg>
         <pc:picChg chg="add del mod ord">
-          <ac:chgData name="Edward Bosko" userId="3c2d16a148962151" providerId="LiveId" clId="{A3B7949D-3481-482C-8D79-C7CE87E70E15}" dt="2025-03-04T07:46:01.286" v="3799" actId="478"/>
-          <ac:picMkLst>
-            <pc:docMk/>
-            <pc:sldMk cId="2630178930" sldId="267"/>
-            <ac:picMk id="14" creationId="{5621D80F-8BB8-C6E0-EFE9-B65FC3FD74C4}"/>
-          </ac:picMkLst>
-        </pc:picChg>
-        <pc:picChg chg="add mod ord">
-          <ac:chgData name="Edward Bosko" userId="3c2d16a148962151" providerId="LiveId" clId="{A3B7949D-3481-482C-8D79-C7CE87E70E15}" dt="2025-03-04T07:46:13.701" v="3802" actId="14100"/>
+          <ac:chgData name="Edward Bosko" userId="3c2d16a148962151" providerId="LiveId" clId="{A3B7949D-3481-482C-8D79-C7CE87E70E15}" dt="2025-03-05T23:25:04.187" v="4667" actId="478"/>
           <ac:picMkLst>
             <pc:docMk/>
             <pc:sldMk cId="2630178930" sldId="267"/>
@@ -556,7 +457,7 @@
         </pc:picChg>
       </pc:sldChg>
       <pc:sldChg chg="addSp delSp modSp new mod">
-        <pc:chgData name="Edward Bosko" userId="3c2d16a148962151" providerId="LiveId" clId="{A3B7949D-3481-482C-8D79-C7CE87E70E15}" dt="2025-03-04T01:33:34.468" v="3699" actId="14100"/>
+        <pc:chgData name="Edward Bosko" userId="3c2d16a148962151" providerId="LiveId" clId="{A3B7949D-3481-482C-8D79-C7CE87E70E15}" dt="2025-03-05T23:56:44.129" v="4834" actId="1076"/>
         <pc:sldMkLst>
           <pc:docMk/>
           <pc:sldMk cId="2578946647" sldId="268"/>
@@ -569,24 +470,48 @@
             <ac:spMk id="2" creationId="{8EA0DD35-2C47-FBB0-D829-8537A77A0303}"/>
           </ac:spMkLst>
         </pc:spChg>
-        <pc:spChg chg="del">
-          <ac:chgData name="Edward Bosko" userId="3c2d16a148962151" providerId="LiveId" clId="{A3B7949D-3481-482C-8D79-C7CE87E70E15}" dt="2025-03-04T01:21:11.692" v="3694" actId="22"/>
+        <pc:spChg chg="add del mod">
+          <ac:chgData name="Edward Bosko" userId="3c2d16a148962151" providerId="LiveId" clId="{A3B7949D-3481-482C-8D79-C7CE87E70E15}" dt="2025-03-05T23:41:15.578" v="4818" actId="22"/>
           <ac:spMkLst>
             <pc:docMk/>
             <pc:sldMk cId="2578946647" sldId="268"/>
-            <ac:spMk id="3" creationId="{8052C51A-09FB-90B0-7A6A-867F28DD4F66}"/>
+            <ac:spMk id="4" creationId="{F7007425-99C8-2371-96EA-B7F743217530}"/>
           </ac:spMkLst>
         </pc:spChg>
-        <pc:spChg chg="del">
-          <ac:chgData name="Edward Bosko" userId="3c2d16a148962151" providerId="LiveId" clId="{A3B7949D-3481-482C-8D79-C7CE87E70E15}" dt="2025-03-04T01:33:29.380" v="3698" actId="22"/>
+        <pc:spChg chg="add del mod">
+          <ac:chgData name="Edward Bosko" userId="3c2d16a148962151" providerId="LiveId" clId="{A3B7949D-3481-482C-8D79-C7CE87E70E15}" dt="2025-03-05T23:42:15.803" v="4822" actId="22"/>
           <ac:spMkLst>
             <pc:docMk/>
             <pc:sldMk cId="2578946647" sldId="268"/>
-            <ac:spMk id="4" creationId="{FA764802-19AB-638F-E621-C75C85ABDDCC}"/>
+            <ac:spMk id="10" creationId="{A1537C80-912F-3568-2E72-20E464865A9A}"/>
           </ac:spMkLst>
         </pc:spChg>
-        <pc:picChg chg="add mod ord">
-          <ac:chgData name="Edward Bosko" userId="3c2d16a148962151" providerId="LiveId" clId="{A3B7949D-3481-482C-8D79-C7CE87E70E15}" dt="2025-03-04T01:21:26.239" v="3697" actId="14100"/>
+        <pc:spChg chg="add del mod">
+          <ac:chgData name="Edward Bosko" userId="3c2d16a148962151" providerId="LiveId" clId="{A3B7949D-3481-482C-8D79-C7CE87E70E15}" dt="2025-03-05T23:56:04.180" v="4827" actId="22"/>
+          <ac:spMkLst>
+            <pc:docMk/>
+            <pc:sldMk cId="2578946647" sldId="268"/>
+            <ac:spMk id="14" creationId="{D4BC7144-F819-0D95-94AE-F014D536863C}"/>
+          </ac:spMkLst>
+        </pc:spChg>
+        <pc:spChg chg="add del mod">
+          <ac:chgData name="Edward Bosko" userId="3c2d16a148962151" providerId="LiveId" clId="{A3B7949D-3481-482C-8D79-C7CE87E70E15}" dt="2025-03-05T23:56:16.571" v="4829" actId="22"/>
+          <ac:spMkLst>
+            <pc:docMk/>
+            <pc:sldMk cId="2578946647" sldId="268"/>
+            <ac:spMk id="18" creationId="{ECA64E2B-5D69-D615-6512-C803EFCA0E03}"/>
+          </ac:spMkLst>
+        </pc:spChg>
+        <pc:spChg chg="add del mod">
+          <ac:chgData name="Edward Bosko" userId="3c2d16a148962151" providerId="LiveId" clId="{A3B7949D-3481-482C-8D79-C7CE87E70E15}" dt="2025-03-05T23:56:23.217" v="4831" actId="22"/>
+          <ac:spMkLst>
+            <pc:docMk/>
+            <pc:sldMk cId="2578946647" sldId="268"/>
+            <ac:spMk id="22" creationId="{BF3C3180-BB6B-EA3B-B21F-55E202A2E11E}"/>
+          </ac:spMkLst>
+        </pc:spChg>
+        <pc:picChg chg="add del mod ord">
+          <ac:chgData name="Edward Bosko" userId="3c2d16a148962151" providerId="LiveId" clId="{A3B7949D-3481-482C-8D79-C7CE87E70E15}" dt="2025-03-05T23:41:13.865" v="4817" actId="478"/>
           <ac:picMkLst>
             <pc:docMk/>
             <pc:sldMk cId="2578946647" sldId="268"/>
@@ -594,16 +519,56 @@
           </ac:picMkLst>
         </pc:picChg>
         <pc:picChg chg="add mod ord">
-          <ac:chgData name="Edward Bosko" userId="3c2d16a148962151" providerId="LiveId" clId="{A3B7949D-3481-482C-8D79-C7CE87E70E15}" dt="2025-03-04T01:33:34.468" v="3699" actId="14100"/>
+          <ac:chgData name="Edward Bosko" userId="3c2d16a148962151" providerId="LiveId" clId="{A3B7949D-3481-482C-8D79-C7CE87E70E15}" dt="2025-03-05T23:41:23.945" v="4820" actId="14100"/>
+          <ac:picMkLst>
+            <pc:docMk/>
+            <pc:sldMk cId="2578946647" sldId="268"/>
+            <ac:picMk id="7" creationId="{88CF53B4-E139-29F7-AEE7-6D176930C42C}"/>
+          </ac:picMkLst>
+        </pc:picChg>
+        <pc:picChg chg="add del mod ord">
+          <ac:chgData name="Edward Bosko" userId="3c2d16a148962151" providerId="LiveId" clId="{A3B7949D-3481-482C-8D79-C7CE87E70E15}" dt="2025-03-05T23:42:14.441" v="4821" actId="478"/>
           <ac:picMkLst>
             <pc:docMk/>
             <pc:sldMk cId="2578946647" sldId="268"/>
             <ac:picMk id="8" creationId="{5117ECFD-0BAD-8300-81A9-797DAEBED68F}"/>
           </ac:picMkLst>
         </pc:picChg>
+        <pc:picChg chg="add del mod ord">
+          <ac:chgData name="Edward Bosko" userId="3c2d16a148962151" providerId="LiveId" clId="{A3B7949D-3481-482C-8D79-C7CE87E70E15}" dt="2025-03-05T23:56:02.171" v="4826" actId="478"/>
+          <ac:picMkLst>
+            <pc:docMk/>
+            <pc:sldMk cId="2578946647" sldId="268"/>
+            <ac:picMk id="12" creationId="{3DB870EF-094D-F837-F17F-27D3783D4A5E}"/>
+          </ac:picMkLst>
+        </pc:picChg>
+        <pc:picChg chg="add del mod ord">
+          <ac:chgData name="Edward Bosko" userId="3c2d16a148962151" providerId="LiveId" clId="{A3B7949D-3481-482C-8D79-C7CE87E70E15}" dt="2025-03-05T23:56:14.457" v="4828" actId="478"/>
+          <ac:picMkLst>
+            <pc:docMk/>
+            <pc:sldMk cId="2578946647" sldId="268"/>
+            <ac:picMk id="16" creationId="{CCC9D363-4C82-D016-1BF7-A0457E6C2825}"/>
+          </ac:picMkLst>
+        </pc:picChg>
+        <pc:picChg chg="add del mod ord">
+          <ac:chgData name="Edward Bosko" userId="3c2d16a148962151" providerId="LiveId" clId="{A3B7949D-3481-482C-8D79-C7CE87E70E15}" dt="2025-03-05T23:56:17.880" v="4830" actId="478"/>
+          <ac:picMkLst>
+            <pc:docMk/>
+            <pc:sldMk cId="2578946647" sldId="268"/>
+            <ac:picMk id="20" creationId="{0FF68962-E23B-AD7B-E3B3-1832E70B22C6}"/>
+          </ac:picMkLst>
+        </pc:picChg>
+        <pc:picChg chg="add mod ord">
+          <ac:chgData name="Edward Bosko" userId="3c2d16a148962151" providerId="LiveId" clId="{A3B7949D-3481-482C-8D79-C7CE87E70E15}" dt="2025-03-05T23:56:44.129" v="4834" actId="1076"/>
+          <ac:picMkLst>
+            <pc:docMk/>
+            <pc:sldMk cId="2578946647" sldId="268"/>
+            <ac:picMk id="24" creationId="{4A9DB552-01F9-FDA7-C714-D78C7E83C56F}"/>
+          </ac:picMkLst>
+        </pc:picChg>
       </pc:sldChg>
       <pc:sldChg chg="addSp modSp new mod">
-        <pc:chgData name="Edward Bosko" userId="3c2d16a148962151" providerId="LiveId" clId="{A3B7949D-3481-482C-8D79-C7CE87E70E15}" dt="2025-03-04T08:11:19.368" v="4458" actId="20577"/>
+        <pc:chgData name="Edward Bosko" userId="3c2d16a148962151" providerId="LiveId" clId="{A3B7949D-3481-482C-8D79-C7CE87E70E15}" dt="2025-03-06T05:12:54.323" v="4835" actId="20577"/>
         <pc:sldMkLst>
           <pc:docMk/>
           <pc:sldMk cId="3695391281" sldId="269"/>
@@ -617,7 +582,7 @@
           </ac:spMkLst>
         </pc:spChg>
         <pc:spChg chg="mod">
-          <ac:chgData name="Edward Bosko" userId="3c2d16a148962151" providerId="LiveId" clId="{A3B7949D-3481-482C-8D79-C7CE87E70E15}" dt="2025-03-04T08:11:19.368" v="4458" actId="20577"/>
+          <ac:chgData name="Edward Bosko" userId="3c2d16a148962151" providerId="LiveId" clId="{A3B7949D-3481-482C-8D79-C7CE87E70E15}" dt="2025-03-06T05:12:54.323" v="4835" actId="20577"/>
           <ac:spMkLst>
             <pc:docMk/>
             <pc:sldMk cId="3695391281" sldId="269"/>
@@ -647,14 +612,6 @@
             <ac:spMk id="3" creationId="{82DFDD9E-82B1-8DF1-17B9-9C32670B9373}"/>
           </ac:spMkLst>
         </pc:spChg>
-        <pc:picChg chg="del">
-          <ac:chgData name="Edward Bosko" userId="3c2d16a148962151" providerId="LiveId" clId="{A3B7949D-3481-482C-8D79-C7CE87E70E15}" dt="2025-03-04T07:54:49.123" v="4072" actId="478"/>
-          <ac:picMkLst>
-            <pc:docMk/>
-            <pc:sldMk cId="4024229787" sldId="270"/>
-            <ac:picMk id="5" creationId="{0CAFC005-DC4C-1F22-7F1B-00B9AC6B2028}"/>
-          </ac:picMkLst>
-        </pc:picChg>
         <pc:picChg chg="add mod">
           <ac:chgData name="Edward Bosko" userId="3c2d16a148962151" providerId="LiveId" clId="{A3B7949D-3481-482C-8D79-C7CE87E70E15}" dt="2025-03-04T07:55:27.733" v="4077" actId="14100"/>
           <ac:picMkLst>
@@ -918,7 +875,7 @@
           <a:p>
             <a:fld id="{76295A30-1F5C-4558-8D90-C6BFA978BB9D}" type="datetimeFigureOut">
               <a:rPr lang="en-US" smtClean="0"/>
-              <a:t>3/3/2025</a:t>
+              <a:t>3/5/2025</a:t>
             </a:fld>
             <a:endParaRPr lang="en-US"/>
           </a:p>
@@ -1126,7 +1083,7 @@
           <a:p>
             <a:fld id="{76295A30-1F5C-4558-8D90-C6BFA978BB9D}" type="datetimeFigureOut">
               <a:rPr lang="en-US" smtClean="0"/>
-              <a:t>3/3/2025</a:t>
+              <a:t>3/5/2025</a:t>
             </a:fld>
             <a:endParaRPr lang="en-US"/>
           </a:p>
@@ -1382,7 +1339,7 @@
           <a:p>
             <a:fld id="{76295A30-1F5C-4558-8D90-C6BFA978BB9D}" type="datetimeFigureOut">
               <a:rPr lang="en-US" smtClean="0"/>
-              <a:t>3/3/2025</a:t>
+              <a:t>3/5/2025</a:t>
             </a:fld>
             <a:endParaRPr lang="en-US"/>
           </a:p>
@@ -1556,7 +1513,7 @@
           <a:p>
             <a:fld id="{76295A30-1F5C-4558-8D90-C6BFA978BB9D}" type="datetimeFigureOut">
               <a:rPr lang="en-US" smtClean="0"/>
-              <a:t>3/3/2025</a:t>
+              <a:t>3/5/2025</a:t>
             </a:fld>
             <a:endParaRPr lang="en-US"/>
           </a:p>
@@ -1899,7 +1856,7 @@
           <a:p>
             <a:fld id="{76295A30-1F5C-4558-8D90-C6BFA978BB9D}" type="datetimeFigureOut">
               <a:rPr lang="en-US" smtClean="0"/>
-              <a:t>3/3/2025</a:t>
+              <a:t>3/5/2025</a:t>
             </a:fld>
             <a:endParaRPr lang="en-US"/>
           </a:p>
@@ -2174,7 +2131,7 @@
           <a:p>
             <a:fld id="{76295A30-1F5C-4558-8D90-C6BFA978BB9D}" type="datetimeFigureOut">
               <a:rPr lang="en-US" smtClean="0"/>
-              <a:t>3/3/2025</a:t>
+              <a:t>3/5/2025</a:t>
             </a:fld>
             <a:endParaRPr lang="en-US"/>
           </a:p>
@@ -2553,7 +2510,7 @@
           <a:p>
             <a:fld id="{76295A30-1F5C-4558-8D90-C6BFA978BB9D}" type="datetimeFigureOut">
               <a:rPr lang="en-US" smtClean="0"/>
-              <a:t>3/3/2025</a:t>
+              <a:t>3/5/2025</a:t>
             </a:fld>
             <a:endParaRPr lang="en-US"/>
           </a:p>
@@ -2671,7 +2628,7 @@
           <a:p>
             <a:fld id="{76295A30-1F5C-4558-8D90-C6BFA978BB9D}" type="datetimeFigureOut">
               <a:rPr lang="en-US" smtClean="0"/>
-              <a:t>3/3/2025</a:t>
+              <a:t>3/5/2025</a:t>
             </a:fld>
             <a:endParaRPr lang="en-US"/>
           </a:p>
@@ -2842,7 +2799,7 @@
           <a:p>
             <a:fld id="{76295A30-1F5C-4558-8D90-C6BFA978BB9D}" type="datetimeFigureOut">
               <a:rPr lang="en-US" smtClean="0"/>
-              <a:t>3/3/2025</a:t>
+              <a:t>3/5/2025</a:t>
             </a:fld>
             <a:endParaRPr lang="en-US"/>
           </a:p>
@@ -3196,7 +3153,7 @@
           <a:p>
             <a:fld id="{76295A30-1F5C-4558-8D90-C6BFA978BB9D}" type="datetimeFigureOut">
               <a:rPr lang="en-US" smtClean="0"/>
-              <a:t>3/3/2025</a:t>
+              <a:t>3/5/2025</a:t>
             </a:fld>
             <a:endParaRPr lang="en-US"/>
           </a:p>
@@ -3578,7 +3535,7 @@
           <a:p>
             <a:fld id="{76295A30-1F5C-4558-8D90-C6BFA978BB9D}" type="datetimeFigureOut">
               <a:rPr lang="en-US" smtClean="0"/>
-              <a:t>3/3/2025</a:t>
+              <a:t>3/5/2025</a:t>
             </a:fld>
             <a:endParaRPr lang="en-US"/>
           </a:p>
@@ -3865,7 +3822,7 @@
           <a:p>
             <a:fld id="{76295A30-1F5C-4558-8D90-C6BFA978BB9D}" type="datetimeFigureOut">
               <a:rPr lang="en-US" smtClean="0"/>
-              <a:t>3/3/2025</a:t>
+              <a:t>3/5/2025</a:t>
             </a:fld>
             <a:endParaRPr lang="en-US"/>
           </a:p>
@@ -4809,7 +4766,7 @@
           <a:p>
             <a:r>
               <a:rPr lang="en-US" dirty="0"/>
-              <a:t>Works Cited</a:t>
+              <a:t>Sources</a:t>
             </a:r>
           </a:p>
         </p:txBody>
@@ -5868,7 +5825,7 @@
             </a:pPr>
             <a:r>
               <a:rPr lang="en-US" dirty="0"/>
-              <a:t>PROC GLIMMIX with cumulative logit link, lobe as fixed effect, random intercepts, and rater as random effect</a:t>
+              <a:t>PROC GLIMMIX with cumulative logit link, lobe as fixed effect, random intercepts, and rater as fixed and random effect</a:t>
             </a:r>
           </a:p>
           <a:p>
@@ -5887,7 +5844,7 @@
             </a:pPr>
             <a:r>
               <a:rPr lang="en-US" dirty="0"/>
-              <a:t>PROC GLIMMIX with logit link, lobe as fixed effect, random intercepts, and rater as random effect</a:t>
+              <a:t>PROC GLIMMIX with logit link, lobe as fixed effect, random intercepts, and rater as fixed and random effect</a:t>
             </a:r>
           </a:p>
           <a:p>
@@ -5897,7 +5854,7 @@
             </a:pPr>
             <a:r>
               <a:rPr lang="en-US" dirty="0"/>
-              <a:t>Model only converged for large nodule feature, thin and thick wall cavity models have rater as fixed effect*</a:t>
+              <a:t>Model only converged for thin wall cavity feature, large nodules converged with rater as random effect but not fixed effect, thick wall cavity converged with rater as fixed effect but not random effect*</a:t>
             </a:r>
           </a:p>
         </p:txBody>
@@ -6051,8 +6008,13 @@
             </a:pPr>
             <a:r>
               <a:rPr lang="en-US" dirty="0"/>
-              <a:t>Was also able to successfully model rater as random effect for large nodule and thin wall cavity features, not thick wall cavity</a:t>
-            </a:r>
+              <a:t>Was also able to successfully model rater as random effect for large nodule and thin wall cavity features, not thick </a:t>
+            </a:r>
+            <a:r>
+              <a:rPr lang="en-US"/>
+              <a:t>wall cavity*</a:t>
+            </a:r>
+            <a:endParaRPr lang="en-US" dirty="0"/>
           </a:p>
         </p:txBody>
       </p:sp>
@@ -6156,10 +6118,10 @@
       </p:sp>
       <p:pic>
         <p:nvPicPr>
-          <p:cNvPr id="6" name="Content Placeholder 5">
+          <p:cNvPr id="7" name="Content Placeholder 6">
             <a:extLst>
               <a:ext uri="{FF2B5EF4-FFF2-40B4-BE49-F238E27FC236}">
-                <a16:creationId xmlns:a16="http://schemas.microsoft.com/office/drawing/2014/main" id="{8117DBC7-E23A-D46D-C15C-74DA21D2EB7D}"/>
+                <a16:creationId xmlns:a16="http://schemas.microsoft.com/office/drawing/2014/main" id="{0D0C95A1-88BE-082D-3A8B-484999B3B7AE}"/>
               </a:ext>
             </a:extLst>
           </p:cNvPr>
@@ -6178,17 +6140,17 @@
         </p:blipFill>
         <p:spPr>
           <a:xfrm>
-            <a:off x="460790" y="2431702"/>
-            <a:ext cx="6007181" cy="2617414"/>
+            <a:off x="215365" y="2333679"/>
+            <a:ext cx="6509062" cy="3700356"/>
           </a:xfrm>
         </p:spPr>
       </p:pic>
       <p:pic>
         <p:nvPicPr>
-          <p:cNvPr id="18" name="Content Placeholder 17">
+          <p:cNvPr id="11" name="Content Placeholder 10">
             <a:extLst>
               <a:ext uri="{FF2B5EF4-FFF2-40B4-BE49-F238E27FC236}">
-                <a16:creationId xmlns:a16="http://schemas.microsoft.com/office/drawing/2014/main" id="{8CE805FF-5AB2-9544-50B8-A6C8C8296CAD}"/>
+                <a16:creationId xmlns:a16="http://schemas.microsoft.com/office/drawing/2014/main" id="{EA97D9EC-6128-B7C4-00EA-4BC81BDF61EF}"/>
               </a:ext>
             </a:extLst>
           </p:cNvPr>
@@ -6207,8 +6169,8 @@
         </p:blipFill>
         <p:spPr>
           <a:xfrm>
-            <a:off x="6801600" y="1783289"/>
-            <a:ext cx="4266659" cy="4552197"/>
+            <a:off x="6640458" y="1803679"/>
+            <a:ext cx="4586682" cy="4508277"/>
           </a:xfrm>
         </p:spPr>
       </p:pic>
@@ -6272,10 +6234,10 @@
       </p:sp>
       <p:pic>
         <p:nvPicPr>
-          <p:cNvPr id="6" name="Content Placeholder 5">
+          <p:cNvPr id="7" name="Content Placeholder 6">
             <a:extLst>
               <a:ext uri="{FF2B5EF4-FFF2-40B4-BE49-F238E27FC236}">
-                <a16:creationId xmlns:a16="http://schemas.microsoft.com/office/drawing/2014/main" id="{B9D82C8F-7721-F193-8B14-99C88FB7FC26}"/>
+                <a16:creationId xmlns:a16="http://schemas.microsoft.com/office/drawing/2014/main" id="{88CF53B4-E139-29F7-AEE7-6D176930C42C}"/>
               </a:ext>
             </a:extLst>
           </p:cNvPr>
@@ -6294,17 +6256,17 @@
         </p:blipFill>
         <p:spPr>
           <a:xfrm>
-            <a:off x="30501" y="2225711"/>
-            <a:ext cx="6187419" cy="2855731"/>
+            <a:off x="80444" y="2421653"/>
+            <a:ext cx="6115431" cy="2519192"/>
           </a:xfrm>
         </p:spPr>
       </p:pic>
       <p:pic>
         <p:nvPicPr>
-          <p:cNvPr id="8" name="Content Placeholder 7">
+          <p:cNvPr id="24" name="Content Placeholder 23">
             <a:extLst>
               <a:ext uri="{FF2B5EF4-FFF2-40B4-BE49-F238E27FC236}">
-                <a16:creationId xmlns:a16="http://schemas.microsoft.com/office/drawing/2014/main" id="{5117ECFD-0BAD-8300-81A9-797DAEBED68F}"/>
+                <a16:creationId xmlns:a16="http://schemas.microsoft.com/office/drawing/2014/main" id="{4A9DB552-01F9-FDA7-C714-D78C7E83C56F}"/>
               </a:ext>
             </a:extLst>
           </p:cNvPr>
@@ -6323,8 +6285,8 @@
         </p:blipFill>
         <p:spPr>
           <a:xfrm>
-            <a:off x="6218238" y="2311121"/>
-            <a:ext cx="5992908" cy="2629724"/>
+            <a:off x="6126480" y="2146020"/>
+            <a:ext cx="8312544" cy="2638377"/>
           </a:xfrm>
         </p:spPr>
       </p:pic>
@@ -6454,7 +6416,7 @@
             </a:pPr>
             <a:r>
               <a:rPr lang="en-US" dirty="0"/>
-              <a:t>Results from R models similar, but RML-LLS and LLS-RUL comparisons not significantly different</a:t>
+              <a:t>Results from R models similar</a:t>
             </a:r>
           </a:p>
         </p:txBody>

</xml_diff>

<commit_message>
may 21 before intro edits
</commit_message>
<xml_diff>
--- a/Reports/Preliminary Findings PPT.pptx
+++ b/Reports/Preliminary Findings PPT.pptx
@@ -123,16 +123,32 @@
 </p:presentation>
 </file>
 
-<file path=ppt/revisionInfo.xml><?xml version="1.0" encoding="utf-8"?>
-<p1510:revInfo xmlns:a="http://schemas.openxmlformats.org/drawingml/2006/main" xmlns:r="http://schemas.openxmlformats.org/officeDocument/2006/relationships" xmlns:p1510="http://schemas.microsoft.com/office/powerpoint/2015/10/main">
-  <p1510:revLst>
-    <p1510:client id="{A3B7949D-3481-482C-8D79-C7CE87E70E15}" v="9" dt="2025-03-04T07:53:15.877"/>
-  </p1510:revLst>
-</p1510:revInfo>
-</file>
-
 <file path=ppt/changesInfos/changesInfo1.xml><?xml version="1.0" encoding="utf-8"?>
 <pc:chgInfo xmlns:a="http://schemas.openxmlformats.org/drawingml/2006/main" xmlns:r="http://schemas.openxmlformats.org/officeDocument/2006/relationships" xmlns:ac="http://schemas.microsoft.com/office/drawing/2013/main/command" xmlns:pc="http://schemas.microsoft.com/office/powerpoint/2013/main/command">
+  <pc:docChgLst>
+    <pc:chgData name="Edward Bosko" userId="3c2d16a148962151" providerId="LiveId" clId="{916EC0B8-850E-4D17-942C-DE04F41D2A52}"/>
+    <pc:docChg chg="modSld">
+      <pc:chgData name="Edward Bosko" userId="3c2d16a148962151" providerId="LiveId" clId="{916EC0B8-850E-4D17-942C-DE04F41D2A52}" dt="2025-05-19T04:37:21.899" v="1" actId="20577"/>
+      <pc:docMkLst>
+        <pc:docMk/>
+      </pc:docMkLst>
+      <pc:sldChg chg="modSp mod">
+        <pc:chgData name="Edward Bosko" userId="3c2d16a148962151" providerId="LiveId" clId="{916EC0B8-850E-4D17-942C-DE04F41D2A52}" dt="2025-05-19T04:37:21.899" v="1" actId="20577"/>
+        <pc:sldMkLst>
+          <pc:docMk/>
+          <pc:sldMk cId="46355913" sldId="262"/>
+        </pc:sldMkLst>
+        <pc:spChg chg="mod">
+          <ac:chgData name="Edward Bosko" userId="3c2d16a148962151" providerId="LiveId" clId="{916EC0B8-850E-4D17-942C-DE04F41D2A52}" dt="2025-05-19T04:37:21.899" v="1" actId="20577"/>
+          <ac:spMkLst>
+            <pc:docMk/>
+            <pc:sldMk cId="46355913" sldId="262"/>
+            <ac:spMk id="3" creationId="{8D61B712-5DFC-D618-CE58-AFCF4F464DF1}"/>
+          </ac:spMkLst>
+        </pc:spChg>
+      </pc:sldChg>
+    </pc:docChg>
+  </pc:docChgLst>
   <pc:docChgLst>
     <pc:chgData name="Edward Bosko" userId="3c2d16a148962151" providerId="LiveId" clId="{A3B7949D-3481-482C-8D79-C7CE87E70E15}"/>
     <pc:docChg chg="undo redo custSel addSld delSld modSld">
@@ -407,30 +423,6 @@
             <ac:spMk id="2" creationId="{045F794B-9552-48F7-CC3F-91158C31F53A}"/>
           </ac:spMkLst>
         </pc:spChg>
-        <pc:spChg chg="add del mod">
-          <ac:chgData name="Edward Bosko" userId="3c2d16a148962151" providerId="LiveId" clId="{A3B7949D-3481-482C-8D79-C7CE87E70E15}" dt="2025-03-05T23:24:45.236" v="4661" actId="22"/>
-          <ac:spMkLst>
-            <pc:docMk/>
-            <pc:sldMk cId="2630178930" sldId="267"/>
-            <ac:spMk id="4" creationId="{2ED9F59E-8682-9630-279F-04A03D4772D1}"/>
-          </ac:spMkLst>
-        </pc:spChg>
-        <pc:spChg chg="add del mod">
-          <ac:chgData name="Edward Bosko" userId="3c2d16a148962151" providerId="LiveId" clId="{A3B7949D-3481-482C-8D79-C7CE87E70E15}" dt="2025-03-05T23:25:32.979" v="4668" actId="22"/>
-          <ac:spMkLst>
-            <pc:docMk/>
-            <pc:sldMk cId="2630178930" sldId="267"/>
-            <ac:spMk id="9" creationId="{27CF0E58-DE1B-A1C2-526A-71AD1692B7FE}"/>
-          </ac:spMkLst>
-        </pc:spChg>
-        <pc:picChg chg="add del mod ord">
-          <ac:chgData name="Edward Bosko" userId="3c2d16a148962151" providerId="LiveId" clId="{A3B7949D-3481-482C-8D79-C7CE87E70E15}" dt="2025-03-05T23:24:43.210" v="4660" actId="478"/>
-          <ac:picMkLst>
-            <pc:docMk/>
-            <pc:sldMk cId="2630178930" sldId="267"/>
-            <ac:picMk id="6" creationId="{8117DBC7-E23A-D46D-C15C-74DA21D2EB7D}"/>
-          </ac:picMkLst>
-        </pc:picChg>
         <pc:picChg chg="add mod ord">
           <ac:chgData name="Edward Bosko" userId="3c2d16a148962151" providerId="LiveId" clId="{A3B7949D-3481-482C-8D79-C7CE87E70E15}" dt="2025-03-05T23:25:01.976" v="4665" actId="1076"/>
           <ac:picMkLst>
@@ -445,14 +437,6 @@
             <pc:docMk/>
             <pc:sldMk cId="2630178930" sldId="267"/>
             <ac:picMk id="11" creationId="{EA97D9EC-6128-B7C4-00EA-4BC81BDF61EF}"/>
-          </ac:picMkLst>
-        </pc:picChg>
-        <pc:picChg chg="add del mod ord">
-          <ac:chgData name="Edward Bosko" userId="3c2d16a148962151" providerId="LiveId" clId="{A3B7949D-3481-482C-8D79-C7CE87E70E15}" dt="2025-03-05T23:25:04.187" v="4667" actId="478"/>
-          <ac:picMkLst>
-            <pc:docMk/>
-            <pc:sldMk cId="2630178930" sldId="267"/>
-            <ac:picMk id="18" creationId="{8CE805FF-5AB2-9544-50B8-A6C8C8296CAD}"/>
           </ac:picMkLst>
         </pc:picChg>
       </pc:sldChg>
@@ -470,92 +454,12 @@
             <ac:spMk id="2" creationId="{8EA0DD35-2C47-FBB0-D829-8537A77A0303}"/>
           </ac:spMkLst>
         </pc:spChg>
-        <pc:spChg chg="add del mod">
-          <ac:chgData name="Edward Bosko" userId="3c2d16a148962151" providerId="LiveId" clId="{A3B7949D-3481-482C-8D79-C7CE87E70E15}" dt="2025-03-05T23:41:15.578" v="4818" actId="22"/>
-          <ac:spMkLst>
-            <pc:docMk/>
-            <pc:sldMk cId="2578946647" sldId="268"/>
-            <ac:spMk id="4" creationId="{F7007425-99C8-2371-96EA-B7F743217530}"/>
-          </ac:spMkLst>
-        </pc:spChg>
-        <pc:spChg chg="add del mod">
-          <ac:chgData name="Edward Bosko" userId="3c2d16a148962151" providerId="LiveId" clId="{A3B7949D-3481-482C-8D79-C7CE87E70E15}" dt="2025-03-05T23:42:15.803" v="4822" actId="22"/>
-          <ac:spMkLst>
-            <pc:docMk/>
-            <pc:sldMk cId="2578946647" sldId="268"/>
-            <ac:spMk id="10" creationId="{A1537C80-912F-3568-2E72-20E464865A9A}"/>
-          </ac:spMkLst>
-        </pc:spChg>
-        <pc:spChg chg="add del mod">
-          <ac:chgData name="Edward Bosko" userId="3c2d16a148962151" providerId="LiveId" clId="{A3B7949D-3481-482C-8D79-C7CE87E70E15}" dt="2025-03-05T23:56:04.180" v="4827" actId="22"/>
-          <ac:spMkLst>
-            <pc:docMk/>
-            <pc:sldMk cId="2578946647" sldId="268"/>
-            <ac:spMk id="14" creationId="{D4BC7144-F819-0D95-94AE-F014D536863C}"/>
-          </ac:spMkLst>
-        </pc:spChg>
-        <pc:spChg chg="add del mod">
-          <ac:chgData name="Edward Bosko" userId="3c2d16a148962151" providerId="LiveId" clId="{A3B7949D-3481-482C-8D79-C7CE87E70E15}" dt="2025-03-05T23:56:16.571" v="4829" actId="22"/>
-          <ac:spMkLst>
-            <pc:docMk/>
-            <pc:sldMk cId="2578946647" sldId="268"/>
-            <ac:spMk id="18" creationId="{ECA64E2B-5D69-D615-6512-C803EFCA0E03}"/>
-          </ac:spMkLst>
-        </pc:spChg>
-        <pc:spChg chg="add del mod">
-          <ac:chgData name="Edward Bosko" userId="3c2d16a148962151" providerId="LiveId" clId="{A3B7949D-3481-482C-8D79-C7CE87E70E15}" dt="2025-03-05T23:56:23.217" v="4831" actId="22"/>
-          <ac:spMkLst>
-            <pc:docMk/>
-            <pc:sldMk cId="2578946647" sldId="268"/>
-            <ac:spMk id="22" creationId="{BF3C3180-BB6B-EA3B-B21F-55E202A2E11E}"/>
-          </ac:spMkLst>
-        </pc:spChg>
-        <pc:picChg chg="add del mod ord">
-          <ac:chgData name="Edward Bosko" userId="3c2d16a148962151" providerId="LiveId" clId="{A3B7949D-3481-482C-8D79-C7CE87E70E15}" dt="2025-03-05T23:41:13.865" v="4817" actId="478"/>
-          <ac:picMkLst>
-            <pc:docMk/>
-            <pc:sldMk cId="2578946647" sldId="268"/>
-            <ac:picMk id="6" creationId="{B9D82C8F-7721-F193-8B14-99C88FB7FC26}"/>
-          </ac:picMkLst>
-        </pc:picChg>
         <pc:picChg chg="add mod ord">
           <ac:chgData name="Edward Bosko" userId="3c2d16a148962151" providerId="LiveId" clId="{A3B7949D-3481-482C-8D79-C7CE87E70E15}" dt="2025-03-05T23:41:23.945" v="4820" actId="14100"/>
           <ac:picMkLst>
             <pc:docMk/>
             <pc:sldMk cId="2578946647" sldId="268"/>
             <ac:picMk id="7" creationId="{88CF53B4-E139-29F7-AEE7-6D176930C42C}"/>
-          </ac:picMkLst>
-        </pc:picChg>
-        <pc:picChg chg="add del mod ord">
-          <ac:chgData name="Edward Bosko" userId="3c2d16a148962151" providerId="LiveId" clId="{A3B7949D-3481-482C-8D79-C7CE87E70E15}" dt="2025-03-05T23:42:14.441" v="4821" actId="478"/>
-          <ac:picMkLst>
-            <pc:docMk/>
-            <pc:sldMk cId="2578946647" sldId="268"/>
-            <ac:picMk id="8" creationId="{5117ECFD-0BAD-8300-81A9-797DAEBED68F}"/>
-          </ac:picMkLst>
-        </pc:picChg>
-        <pc:picChg chg="add del mod ord">
-          <ac:chgData name="Edward Bosko" userId="3c2d16a148962151" providerId="LiveId" clId="{A3B7949D-3481-482C-8D79-C7CE87E70E15}" dt="2025-03-05T23:56:02.171" v="4826" actId="478"/>
-          <ac:picMkLst>
-            <pc:docMk/>
-            <pc:sldMk cId="2578946647" sldId="268"/>
-            <ac:picMk id="12" creationId="{3DB870EF-094D-F837-F17F-27D3783D4A5E}"/>
-          </ac:picMkLst>
-        </pc:picChg>
-        <pc:picChg chg="add del mod ord">
-          <ac:chgData name="Edward Bosko" userId="3c2d16a148962151" providerId="LiveId" clId="{A3B7949D-3481-482C-8D79-C7CE87E70E15}" dt="2025-03-05T23:56:14.457" v="4828" actId="478"/>
-          <ac:picMkLst>
-            <pc:docMk/>
-            <pc:sldMk cId="2578946647" sldId="268"/>
-            <ac:picMk id="16" creationId="{CCC9D363-4C82-D016-1BF7-A0457E6C2825}"/>
-          </ac:picMkLst>
-        </pc:picChg>
-        <pc:picChg chg="add del mod ord">
-          <ac:chgData name="Edward Bosko" userId="3c2d16a148962151" providerId="LiveId" clId="{A3B7949D-3481-482C-8D79-C7CE87E70E15}" dt="2025-03-05T23:56:17.880" v="4830" actId="478"/>
-          <ac:picMkLst>
-            <pc:docMk/>
-            <pc:sldMk cId="2578946647" sldId="268"/>
-            <ac:picMk id="20" creationId="{0FF68962-E23B-AD7B-E3B3-1832E70B22C6}"/>
           </ac:picMkLst>
         </pc:picChg>
         <pc:picChg chg="add mod ord">
@@ -875,7 +779,7 @@
           <a:p>
             <a:fld id="{76295A30-1F5C-4558-8D90-C6BFA978BB9D}" type="datetimeFigureOut">
               <a:rPr lang="en-US" smtClean="0"/>
-              <a:t>3/5/2025</a:t>
+              <a:t>5/18/2025</a:t>
             </a:fld>
             <a:endParaRPr lang="en-US"/>
           </a:p>
@@ -1083,7 +987,7 @@
           <a:p>
             <a:fld id="{76295A30-1F5C-4558-8D90-C6BFA978BB9D}" type="datetimeFigureOut">
               <a:rPr lang="en-US" smtClean="0"/>
-              <a:t>3/5/2025</a:t>
+              <a:t>5/18/2025</a:t>
             </a:fld>
             <a:endParaRPr lang="en-US"/>
           </a:p>
@@ -1339,7 +1243,7 @@
           <a:p>
             <a:fld id="{76295A30-1F5C-4558-8D90-C6BFA978BB9D}" type="datetimeFigureOut">
               <a:rPr lang="en-US" smtClean="0"/>
-              <a:t>3/5/2025</a:t>
+              <a:t>5/18/2025</a:t>
             </a:fld>
             <a:endParaRPr lang="en-US"/>
           </a:p>
@@ -1513,7 +1417,7 @@
           <a:p>
             <a:fld id="{76295A30-1F5C-4558-8D90-C6BFA978BB9D}" type="datetimeFigureOut">
               <a:rPr lang="en-US" smtClean="0"/>
-              <a:t>3/5/2025</a:t>
+              <a:t>5/18/2025</a:t>
             </a:fld>
             <a:endParaRPr lang="en-US"/>
           </a:p>
@@ -1856,7 +1760,7 @@
           <a:p>
             <a:fld id="{76295A30-1F5C-4558-8D90-C6BFA978BB9D}" type="datetimeFigureOut">
               <a:rPr lang="en-US" smtClean="0"/>
-              <a:t>3/5/2025</a:t>
+              <a:t>5/18/2025</a:t>
             </a:fld>
             <a:endParaRPr lang="en-US"/>
           </a:p>
@@ -2131,7 +2035,7 @@
           <a:p>
             <a:fld id="{76295A30-1F5C-4558-8D90-C6BFA978BB9D}" type="datetimeFigureOut">
               <a:rPr lang="en-US" smtClean="0"/>
-              <a:t>3/5/2025</a:t>
+              <a:t>5/18/2025</a:t>
             </a:fld>
             <a:endParaRPr lang="en-US"/>
           </a:p>
@@ -2510,7 +2414,7 @@
           <a:p>
             <a:fld id="{76295A30-1F5C-4558-8D90-C6BFA978BB9D}" type="datetimeFigureOut">
               <a:rPr lang="en-US" smtClean="0"/>
-              <a:t>3/5/2025</a:t>
+              <a:t>5/18/2025</a:t>
             </a:fld>
             <a:endParaRPr lang="en-US"/>
           </a:p>
@@ -2628,7 +2532,7 @@
           <a:p>
             <a:fld id="{76295A30-1F5C-4558-8D90-C6BFA978BB9D}" type="datetimeFigureOut">
               <a:rPr lang="en-US" smtClean="0"/>
-              <a:t>3/5/2025</a:t>
+              <a:t>5/18/2025</a:t>
             </a:fld>
             <a:endParaRPr lang="en-US"/>
           </a:p>
@@ -2799,7 +2703,7 @@
           <a:p>
             <a:fld id="{76295A30-1F5C-4558-8D90-C6BFA978BB9D}" type="datetimeFigureOut">
               <a:rPr lang="en-US" smtClean="0"/>
-              <a:t>3/5/2025</a:t>
+              <a:t>5/18/2025</a:t>
             </a:fld>
             <a:endParaRPr lang="en-US"/>
           </a:p>
@@ -3153,7 +3057,7 @@
           <a:p>
             <a:fld id="{76295A30-1F5C-4558-8D90-C6BFA978BB9D}" type="datetimeFigureOut">
               <a:rPr lang="en-US" smtClean="0"/>
-              <a:t>3/5/2025</a:t>
+              <a:t>5/18/2025</a:t>
             </a:fld>
             <a:endParaRPr lang="en-US"/>
           </a:p>
@@ -3535,7 +3439,7 @@
           <a:p>
             <a:fld id="{76295A30-1F5C-4558-8D90-C6BFA978BB9D}" type="datetimeFigureOut">
               <a:rPr lang="en-US" smtClean="0"/>
-              <a:t>3/5/2025</a:t>
+              <a:t>5/18/2025</a:t>
             </a:fld>
             <a:endParaRPr lang="en-US"/>
           </a:p>
@@ -3822,7 +3726,7 @@
           <a:p>
             <a:fld id="{76295A30-1F5C-4558-8D90-C6BFA978BB9D}" type="datetimeFigureOut">
               <a:rPr lang="en-US" smtClean="0"/>
-              <a:t>3/5/2025</a:t>
+              <a:t>5/18/2025</a:t>
             </a:fld>
             <a:endParaRPr lang="en-US"/>
           </a:p>
@@ -5617,7 +5521,7 @@
             </a:pPr>
             <a:r>
               <a:rPr lang="en-US" dirty="0"/>
-              <a:t>161 subjects: 6 lobes scored with 2 raters scoring for each subject</a:t>
+              <a:t>166 subjects: 6 lobes scored with 2 raters scoring for each subject</a:t>
             </a:r>
           </a:p>
           <a:p>

</xml_diff>